<commit_message>
Design pattern interview question
</commit_message>
<xml_diff>
--- a/JavaDesignPattern/Notes/CreationalDesignPattern.pptx
+++ b/JavaDesignPattern/Notes/CreationalDesignPattern.pptx
@@ -4422,8 +4422,8 @@
         </p:nvSpPr>
         <p:spPr>
           <a:xfrm>
-            <a:off x="375650" y="2939492"/>
-            <a:ext cx="2679923" cy="3539430"/>
+            <a:off x="375650" y="2782176"/>
+            <a:ext cx="2679923" cy="3970318"/>
           </a:xfrm>
           <a:prstGeom prst="rect">
             <a:avLst/>
@@ -4440,251 +4440,251 @@
           </a:bodyPr>
           <a:lstStyle/>
           <a:p>
-            <a:endParaRPr lang="en-US" sz="800" dirty="0"/>
-          </a:p>
-          <a:p>
-            <a:endParaRPr lang="en-US" sz="800" dirty="0"/>
-          </a:p>
-          <a:p>
-            <a:r>
-              <a:rPr lang="en-US" sz="800" dirty="0"/>
+            <a:endParaRPr lang="en-US" sz="900" dirty="0"/>
+          </a:p>
+          <a:p>
+            <a:endParaRPr lang="en-US" sz="900" dirty="0"/>
+          </a:p>
+          <a:p>
+            <a:r>
+              <a:rPr lang="en-US" sz="900" dirty="0"/>
               <a:t>public class Computer {</a:t>
             </a:r>
           </a:p>
           <a:p>
             <a:r>
-              <a:rPr lang="en-US" sz="800" dirty="0"/>
+              <a:rPr lang="en-US" sz="900" dirty="0"/>
               <a:t>	</a:t>
             </a:r>
           </a:p>
           <a:p>
             <a:r>
-              <a:rPr lang="en-US" sz="800" dirty="0"/>
+              <a:rPr lang="en-US" sz="900" dirty="0"/>
               <a:t>                   //required parameters</a:t>
             </a:r>
           </a:p>
           <a:p>
             <a:r>
-              <a:rPr lang="en-US" sz="800" dirty="0"/>
+              <a:rPr lang="en-US" sz="900" dirty="0"/>
               <a:t>                   private String HDD;</a:t>
             </a:r>
           </a:p>
           <a:p>
             <a:r>
-              <a:rPr lang="en-US" sz="800" dirty="0"/>
+              <a:rPr lang="en-US" sz="900" dirty="0"/>
               <a:t>                   private String RAM;</a:t>
             </a:r>
           </a:p>
           <a:p>
             <a:r>
-              <a:rPr lang="en-US" sz="800" dirty="0"/>
+              <a:rPr lang="en-US" sz="900" dirty="0"/>
               <a:t>	</a:t>
             </a:r>
           </a:p>
           <a:p>
             <a:r>
-              <a:rPr lang="en-US" sz="800" dirty="0"/>
+              <a:rPr lang="en-US" sz="900" dirty="0"/>
               <a:t>                   //optional parameters</a:t>
             </a:r>
           </a:p>
           <a:p>
             <a:r>
-              <a:rPr lang="en-US" sz="800" dirty="0"/>
+              <a:rPr lang="en-US" sz="900" dirty="0"/>
               <a:t>                   private </a:t>
             </a:r>
             <a:r>
-              <a:rPr lang="en-US" sz="800" dirty="0" err="1"/>
+              <a:rPr lang="en-US" sz="900" dirty="0" err="1"/>
               <a:t>boolean</a:t>
             </a:r>
             <a:r>
-              <a:rPr lang="en-US" sz="800" dirty="0"/>
+              <a:rPr lang="en-US" sz="900" dirty="0"/>
               <a:t> </a:t>
             </a:r>
             <a:r>
-              <a:rPr lang="en-US" sz="800" dirty="0" err="1"/>
+              <a:rPr lang="en-US" sz="900" dirty="0" err="1"/>
               <a:t>isGraphicsCardEnabled</a:t>
             </a:r>
             <a:r>
-              <a:rPr lang="en-US" sz="800" dirty="0"/>
+              <a:rPr lang="en-US" sz="900" dirty="0"/>
               <a:t>;</a:t>
             </a:r>
           </a:p>
           <a:p>
             <a:r>
-              <a:rPr lang="en-US" sz="800" dirty="0"/>
+              <a:rPr lang="en-US" sz="900" dirty="0"/>
               <a:t>                   private </a:t>
             </a:r>
             <a:r>
-              <a:rPr lang="en-US" sz="800" dirty="0" err="1"/>
+              <a:rPr lang="en-US" sz="900" dirty="0" err="1"/>
               <a:t>boolean</a:t>
             </a:r>
             <a:r>
-              <a:rPr lang="en-US" sz="800" dirty="0"/>
+              <a:rPr lang="en-US" sz="900" dirty="0"/>
               <a:t> </a:t>
             </a:r>
             <a:r>
-              <a:rPr lang="en-US" sz="800" dirty="0" err="1"/>
+              <a:rPr lang="en-US" sz="900" dirty="0" err="1"/>
               <a:t>isBluetoothEnabled</a:t>
             </a:r>
             <a:r>
-              <a:rPr lang="en-US" sz="800" dirty="0"/>
+              <a:rPr lang="en-US" sz="900" dirty="0"/>
               <a:t>;</a:t>
             </a:r>
           </a:p>
           <a:p>
             <a:r>
-              <a:rPr lang="en-US" sz="800" dirty="0"/>
+              <a:rPr lang="en-US" sz="900" dirty="0"/>
               <a:t>	</a:t>
             </a:r>
           </a:p>
           <a:p>
             <a:r>
-              <a:rPr lang="en-US" sz="800" dirty="0"/>
+              <a:rPr lang="en-US" sz="900" dirty="0"/>
               <a:t>                   public String </a:t>
             </a:r>
             <a:r>
-              <a:rPr lang="en-US" sz="800" dirty="0" err="1"/>
+              <a:rPr lang="en-US" sz="900" dirty="0" err="1"/>
               <a:t>getHDD</a:t>
             </a:r>
             <a:r>
-              <a:rPr lang="en-US" sz="800" dirty="0"/>
+              <a:rPr lang="en-US" sz="900" dirty="0"/>
               <a:t>() {</a:t>
             </a:r>
           </a:p>
           <a:p>
             <a:r>
-              <a:rPr lang="en-US" sz="800" dirty="0"/>
+              <a:rPr lang="en-US" sz="900" dirty="0"/>
               <a:t>                             return HDD;</a:t>
             </a:r>
           </a:p>
           <a:p>
             <a:r>
-              <a:rPr lang="en-US" sz="800" dirty="0"/>
+              <a:rPr lang="en-US" sz="900" dirty="0"/>
               <a:t>                   }</a:t>
             </a:r>
           </a:p>
           <a:p>
-            <a:endParaRPr lang="en-US" sz="800" dirty="0"/>
-          </a:p>
-          <a:p>
-            <a:r>
-              <a:rPr lang="en-US" sz="800" dirty="0"/>
+            <a:endParaRPr lang="en-US" sz="900" dirty="0"/>
+          </a:p>
+          <a:p>
+            <a:r>
+              <a:rPr lang="en-US" sz="900" dirty="0"/>
               <a:t>                   public String </a:t>
             </a:r>
             <a:r>
-              <a:rPr lang="en-US" sz="800" dirty="0" err="1"/>
+              <a:rPr lang="en-US" sz="900" dirty="0" err="1"/>
               <a:t>getRAM</a:t>
             </a:r>
             <a:r>
-              <a:rPr lang="en-US" sz="800" dirty="0"/>
+              <a:rPr lang="en-US" sz="900" dirty="0"/>
               <a:t>() {</a:t>
             </a:r>
           </a:p>
           <a:p>
             <a:r>
-              <a:rPr lang="en-US" sz="800" dirty="0"/>
+              <a:rPr lang="en-US" sz="900" dirty="0"/>
               <a:t>                              return RAM;</a:t>
             </a:r>
           </a:p>
           <a:p>
             <a:r>
-              <a:rPr lang="en-US" sz="800" dirty="0"/>
+              <a:rPr lang="en-US" sz="900" dirty="0"/>
               <a:t>                   }</a:t>
             </a:r>
           </a:p>
           <a:p>
-            <a:endParaRPr lang="en-US" sz="800" dirty="0"/>
-          </a:p>
-          <a:p>
-            <a:r>
-              <a:rPr lang="en-US" sz="800" dirty="0"/>
+            <a:endParaRPr lang="en-US" sz="900" dirty="0"/>
+          </a:p>
+          <a:p>
+            <a:r>
+              <a:rPr lang="en-US" sz="900" dirty="0"/>
               <a:t>                    public </a:t>
             </a:r>
             <a:r>
-              <a:rPr lang="en-US" sz="800" dirty="0" err="1"/>
+              <a:rPr lang="en-US" sz="900" dirty="0" err="1"/>
               <a:t>boolean</a:t>
             </a:r>
             <a:r>
-              <a:rPr lang="en-US" sz="800" dirty="0"/>
+              <a:rPr lang="en-US" sz="900" dirty="0"/>
               <a:t> </a:t>
             </a:r>
             <a:r>
-              <a:rPr lang="en-US" sz="800" dirty="0" err="1"/>
+              <a:rPr lang="en-US" sz="900" dirty="0" err="1"/>
               <a:t>isGraphicsCardEnabled</a:t>
             </a:r>
             <a:r>
-              <a:rPr lang="en-US" sz="800" dirty="0"/>
+              <a:rPr lang="en-US" sz="900" dirty="0"/>
               <a:t>() {</a:t>
             </a:r>
           </a:p>
           <a:p>
             <a:r>
-              <a:rPr lang="en-US" sz="800" dirty="0"/>
+              <a:rPr lang="en-US" sz="900" dirty="0"/>
               <a:t>                                   return </a:t>
             </a:r>
             <a:r>
-              <a:rPr lang="en-US" sz="800" dirty="0" err="1"/>
+              <a:rPr lang="en-US" sz="900" dirty="0" err="1"/>
               <a:t>isGraphicsCardEnabled</a:t>
             </a:r>
             <a:r>
-              <a:rPr lang="en-US" sz="800" dirty="0"/>
+              <a:rPr lang="en-US" sz="900" dirty="0"/>
               <a:t>;</a:t>
             </a:r>
           </a:p>
           <a:p>
             <a:r>
-              <a:rPr lang="en-US" sz="800" dirty="0"/>
+              <a:rPr lang="en-US" sz="900" dirty="0"/>
               <a:t>                    }</a:t>
             </a:r>
           </a:p>
           <a:p>
-            <a:endParaRPr lang="en-US" sz="800" dirty="0"/>
-          </a:p>
-          <a:p>
-            <a:r>
-              <a:rPr lang="en-US" sz="800" dirty="0"/>
+            <a:endParaRPr lang="en-US" sz="900" dirty="0"/>
+          </a:p>
+          <a:p>
+            <a:r>
+              <a:rPr lang="en-US" sz="900" dirty="0"/>
               <a:t>                    public </a:t>
             </a:r>
             <a:r>
-              <a:rPr lang="en-US" sz="800" dirty="0" err="1"/>
+              <a:rPr lang="en-US" sz="900" dirty="0" err="1"/>
               <a:t>boolean</a:t>
             </a:r>
             <a:r>
-              <a:rPr lang="en-US" sz="800" dirty="0"/>
+              <a:rPr lang="en-US" sz="900" dirty="0"/>
               <a:t> </a:t>
             </a:r>
             <a:r>
-              <a:rPr lang="en-US" sz="800" dirty="0" err="1"/>
+              <a:rPr lang="en-US" sz="900" dirty="0" err="1"/>
               <a:t>isBluetoothEnabled</a:t>
             </a:r>
             <a:r>
-              <a:rPr lang="en-US" sz="800" dirty="0"/>
+              <a:rPr lang="en-US" sz="900" dirty="0"/>
               <a:t>() {</a:t>
             </a:r>
           </a:p>
           <a:p>
             <a:r>
-              <a:rPr lang="en-US" sz="800" dirty="0"/>
+              <a:rPr lang="en-US" sz="900" dirty="0"/>
               <a:t>                                   return </a:t>
             </a:r>
             <a:r>
-              <a:rPr lang="en-US" sz="800" dirty="0" err="1"/>
+              <a:rPr lang="en-US" sz="900" dirty="0" err="1"/>
               <a:t>isBluetoothEnabled</a:t>
             </a:r>
             <a:r>
-              <a:rPr lang="en-US" sz="800" dirty="0"/>
+              <a:rPr lang="en-US" sz="900" dirty="0"/>
               <a:t>;</a:t>
             </a:r>
           </a:p>
           <a:p>
             <a:r>
-              <a:rPr lang="en-US" sz="800" dirty="0"/>
+              <a:rPr lang="en-US" sz="900" dirty="0"/>
               <a:t>                    }</a:t>
             </a:r>
           </a:p>
           <a:p>
             <a:r>
-              <a:rPr lang="en-US" sz="800" dirty="0"/>
+              <a:rPr lang="en-US" sz="900" dirty="0"/>
               <a:t>	</a:t>
             </a:r>
           </a:p>
@@ -4704,8 +4704,8 @@
         </p:nvSpPr>
         <p:spPr>
           <a:xfrm>
-            <a:off x="3595126" y="2970415"/>
-            <a:ext cx="3474268" cy="3046988"/>
+            <a:off x="3595126" y="2734437"/>
+            <a:ext cx="3474268" cy="4093428"/>
           </a:xfrm>
           <a:prstGeom prst="rect">
             <a:avLst/>
@@ -4722,265 +4722,265 @@
           </a:bodyPr>
           <a:lstStyle/>
           <a:p>
-            <a:endParaRPr lang="en-US" sz="800" dirty="0"/>
-          </a:p>
-          <a:p>
-            <a:r>
-              <a:rPr lang="en-US" sz="800" dirty="0"/>
+            <a:endParaRPr lang="en-US" sz="1000" dirty="0"/>
+          </a:p>
+          <a:p>
+            <a:r>
+              <a:rPr lang="en-US" sz="1000" dirty="0"/>
               <a:t>	</a:t>
             </a:r>
           </a:p>
           <a:p>
             <a:r>
-              <a:rPr lang="en-US" sz="800" dirty="0"/>
+              <a:rPr lang="en-US" sz="1000" dirty="0"/>
               <a:t>private Computer(ComputerBuilder builder) {</a:t>
             </a:r>
           </a:p>
           <a:p>
             <a:r>
-              <a:rPr lang="en-US" sz="800" dirty="0"/>
+              <a:rPr lang="en-US" sz="1000" dirty="0"/>
               <a:t>                      </a:t>
             </a:r>
             <a:r>
-              <a:rPr lang="en-US" sz="800" dirty="0" err="1"/>
+              <a:rPr lang="en-US" sz="1000" dirty="0" err="1"/>
               <a:t>this.HDD</a:t>
             </a:r>
             <a:r>
-              <a:rPr lang="en-US" sz="800" dirty="0"/>
+              <a:rPr lang="en-US" sz="1000" dirty="0"/>
               <a:t>=</a:t>
             </a:r>
             <a:r>
-              <a:rPr lang="en-US" sz="800" dirty="0" err="1"/>
+              <a:rPr lang="en-US" sz="1000" dirty="0" err="1"/>
               <a:t>builder.HDD</a:t>
             </a:r>
             <a:r>
-              <a:rPr lang="en-US" sz="800" dirty="0"/>
+              <a:rPr lang="en-US" sz="1000" dirty="0"/>
               <a:t>;</a:t>
             </a:r>
           </a:p>
           <a:p>
             <a:r>
-              <a:rPr lang="en-US" sz="800" dirty="0"/>
+              <a:rPr lang="en-US" sz="1000" dirty="0"/>
               <a:t>                      </a:t>
             </a:r>
             <a:r>
-              <a:rPr lang="en-US" sz="800" dirty="0" err="1"/>
+              <a:rPr lang="en-US" sz="1000" dirty="0" err="1"/>
               <a:t>this.RAM</a:t>
             </a:r>
             <a:r>
-              <a:rPr lang="en-US" sz="800" dirty="0"/>
+              <a:rPr lang="en-US" sz="1000" dirty="0"/>
               <a:t>=</a:t>
             </a:r>
             <a:r>
-              <a:rPr lang="en-US" sz="800" dirty="0" err="1"/>
+              <a:rPr lang="en-US" sz="1000" dirty="0" err="1"/>
               <a:t>builder.RAM</a:t>
             </a:r>
             <a:r>
-              <a:rPr lang="en-US" sz="800" dirty="0"/>
+              <a:rPr lang="en-US" sz="1000" dirty="0"/>
               <a:t>;</a:t>
             </a:r>
           </a:p>
           <a:p>
             <a:r>
-              <a:rPr lang="en-US" sz="800" dirty="0"/>
+              <a:rPr lang="en-US" sz="1000" dirty="0"/>
               <a:t>                      </a:t>
             </a:r>
             <a:r>
-              <a:rPr lang="en-US" sz="800" dirty="0" err="1"/>
+              <a:rPr lang="en-US" sz="1000" dirty="0" err="1"/>
               <a:t>this.isGraphicsCardEnabled</a:t>
             </a:r>
             <a:r>
-              <a:rPr lang="en-US" sz="800" dirty="0"/>
+              <a:rPr lang="en-US" sz="1000" dirty="0"/>
               <a:t>=</a:t>
             </a:r>
             <a:r>
-              <a:rPr lang="en-US" sz="800" dirty="0" err="1"/>
+              <a:rPr lang="en-US" sz="1000" dirty="0" err="1"/>
               <a:t>builder.isGraphicsCardEnabled</a:t>
             </a:r>
             <a:r>
-              <a:rPr lang="en-US" sz="800" dirty="0"/>
+              <a:rPr lang="en-US" sz="1000" dirty="0"/>
               <a:t>;</a:t>
             </a:r>
           </a:p>
           <a:p>
             <a:r>
-              <a:rPr lang="en-US" sz="800" dirty="0"/>
+              <a:rPr lang="en-US" sz="1000" dirty="0"/>
               <a:t>                      </a:t>
             </a:r>
             <a:r>
-              <a:rPr lang="en-US" sz="800" dirty="0" err="1"/>
+              <a:rPr lang="en-US" sz="1000" dirty="0" err="1"/>
               <a:t>this.isBluetoothEnabled</a:t>
             </a:r>
             <a:r>
-              <a:rPr lang="en-US" sz="800" dirty="0"/>
+              <a:rPr lang="en-US" sz="1000" dirty="0"/>
               <a:t>=</a:t>
             </a:r>
             <a:r>
-              <a:rPr lang="en-US" sz="800" dirty="0" err="1"/>
+              <a:rPr lang="en-US" sz="1000" dirty="0" err="1"/>
               <a:t>builder.isBluetoothEnabled</a:t>
             </a:r>
             <a:r>
-              <a:rPr lang="en-US" sz="800" dirty="0"/>
+              <a:rPr lang="en-US" sz="1000" dirty="0"/>
               <a:t>;</a:t>
             </a:r>
           </a:p>
           <a:p>
             <a:r>
-              <a:rPr lang="en-US" sz="800" dirty="0"/>
+              <a:rPr lang="en-US" sz="1000" dirty="0"/>
               <a:t>}</a:t>
             </a:r>
           </a:p>
           <a:p>
             <a:r>
-              <a:rPr lang="en-US" sz="800" dirty="0"/>
+              <a:rPr lang="en-US" sz="1000" dirty="0"/>
               <a:t>	</a:t>
             </a:r>
           </a:p>
           <a:p>
             <a:r>
-              <a:rPr lang="en-US" sz="800" dirty="0"/>
+              <a:rPr lang="en-US" sz="1000" dirty="0"/>
               <a:t>//Builder Class</a:t>
             </a:r>
           </a:p>
           <a:p>
             <a:r>
-              <a:rPr lang="en-US" sz="800" dirty="0"/>
+              <a:rPr lang="en-US" sz="1000" dirty="0"/>
               <a:t>public static class ComputerBuilder{</a:t>
             </a:r>
           </a:p>
           <a:p>
-            <a:endParaRPr lang="en-US" sz="800" dirty="0"/>
-          </a:p>
-          <a:p>
-            <a:r>
-              <a:rPr lang="en-US" sz="800" dirty="0"/>
+            <a:endParaRPr lang="en-US" sz="1000" dirty="0"/>
+          </a:p>
+          <a:p>
+            <a:r>
+              <a:rPr lang="en-US" sz="1000" dirty="0"/>
               <a:t>                       // required parameters</a:t>
             </a:r>
           </a:p>
           <a:p>
             <a:r>
-              <a:rPr lang="en-US" sz="800" dirty="0"/>
+              <a:rPr lang="en-US" sz="1000" dirty="0"/>
               <a:t>                      private String HDD;</a:t>
             </a:r>
           </a:p>
           <a:p>
             <a:r>
-              <a:rPr lang="en-US" sz="800" dirty="0"/>
+              <a:rPr lang="en-US" sz="1000" dirty="0"/>
               <a:t>                       private String RAM;</a:t>
             </a:r>
           </a:p>
           <a:p>
-            <a:endParaRPr lang="en-US" sz="800" dirty="0"/>
-          </a:p>
-          <a:p>
-            <a:r>
-              <a:rPr lang="en-US" sz="800" dirty="0"/>
+            <a:endParaRPr lang="en-US" sz="1000" dirty="0"/>
+          </a:p>
+          <a:p>
+            <a:r>
+              <a:rPr lang="en-US" sz="1000" dirty="0"/>
               <a:t>                       // optional parameters</a:t>
             </a:r>
           </a:p>
           <a:p>
             <a:r>
-              <a:rPr lang="en-US" sz="800" dirty="0"/>
+              <a:rPr lang="en-US" sz="1000" dirty="0"/>
               <a:t>                        private </a:t>
             </a:r>
             <a:r>
-              <a:rPr lang="en-US" sz="800" dirty="0" err="1"/>
+              <a:rPr lang="en-US" sz="1000" dirty="0" err="1"/>
               <a:t>boolean</a:t>
             </a:r>
             <a:r>
-              <a:rPr lang="en-US" sz="800" dirty="0"/>
+              <a:rPr lang="en-US" sz="1000" dirty="0"/>
               <a:t> </a:t>
             </a:r>
             <a:r>
-              <a:rPr lang="en-US" sz="800" dirty="0" err="1"/>
+              <a:rPr lang="en-US" sz="1000" dirty="0" err="1"/>
               <a:t>isGraphicsCardEnabled</a:t>
             </a:r>
             <a:r>
-              <a:rPr lang="en-US" sz="800" dirty="0"/>
+              <a:rPr lang="en-US" sz="1000" dirty="0"/>
               <a:t>;</a:t>
             </a:r>
           </a:p>
           <a:p>
             <a:r>
-              <a:rPr lang="en-US" sz="800" dirty="0"/>
+              <a:rPr lang="en-US" sz="1000" dirty="0"/>
               <a:t>                        private </a:t>
             </a:r>
             <a:r>
-              <a:rPr lang="en-US" sz="800" dirty="0" err="1"/>
+              <a:rPr lang="en-US" sz="1000" dirty="0" err="1"/>
               <a:t>boolean</a:t>
             </a:r>
             <a:r>
-              <a:rPr lang="en-US" sz="800" dirty="0"/>
+              <a:rPr lang="en-US" sz="1000" dirty="0"/>
               <a:t> </a:t>
             </a:r>
             <a:r>
-              <a:rPr lang="en-US" sz="800" dirty="0" err="1"/>
+              <a:rPr lang="en-US" sz="1000" dirty="0" err="1"/>
               <a:t>isBluetoothEnabled</a:t>
             </a:r>
             <a:r>
-              <a:rPr lang="en-US" sz="800" dirty="0"/>
+              <a:rPr lang="en-US" sz="1000" dirty="0"/>
               <a:t>;</a:t>
             </a:r>
           </a:p>
           <a:p>
             <a:r>
-              <a:rPr lang="en-US" sz="800" dirty="0"/>
+              <a:rPr lang="en-US" sz="1000" dirty="0"/>
               <a:t>		</a:t>
             </a:r>
           </a:p>
           <a:p>
             <a:r>
-              <a:rPr lang="en-US" sz="800" dirty="0"/>
+              <a:rPr lang="en-US" sz="1000" dirty="0"/>
               <a:t>public ComputerBuilder(String </a:t>
             </a:r>
             <a:r>
-              <a:rPr lang="en-US" sz="800" dirty="0" err="1"/>
+              <a:rPr lang="en-US" sz="1000" dirty="0" err="1"/>
               <a:t>hdd</a:t>
             </a:r>
             <a:r>
-              <a:rPr lang="en-US" sz="800" dirty="0"/>
+              <a:rPr lang="en-US" sz="1000" dirty="0"/>
               <a:t>, String ram){</a:t>
             </a:r>
           </a:p>
           <a:p>
             <a:r>
-              <a:rPr lang="en-US" sz="800" dirty="0"/>
+              <a:rPr lang="en-US" sz="1000" dirty="0"/>
               <a:t>                         </a:t>
             </a:r>
             <a:r>
-              <a:rPr lang="en-US" sz="800" dirty="0" err="1"/>
+              <a:rPr lang="en-US" sz="1000" dirty="0" err="1"/>
               <a:t>this.HDD</a:t>
             </a:r>
             <a:r>
-              <a:rPr lang="en-US" sz="800" dirty="0"/>
+              <a:rPr lang="en-US" sz="1000" dirty="0"/>
               <a:t>=</a:t>
             </a:r>
             <a:r>
-              <a:rPr lang="en-US" sz="800" dirty="0" err="1"/>
+              <a:rPr lang="en-US" sz="1000" dirty="0" err="1"/>
               <a:t>hdd</a:t>
             </a:r>
             <a:r>
-              <a:rPr lang="en-US" sz="800" dirty="0"/>
+              <a:rPr lang="en-US" sz="1000" dirty="0"/>
               <a:t>;</a:t>
             </a:r>
           </a:p>
           <a:p>
             <a:r>
-              <a:rPr lang="en-US" sz="800" dirty="0"/>
+              <a:rPr lang="en-US" sz="1000" dirty="0"/>
               <a:t>                         </a:t>
             </a:r>
             <a:r>
-              <a:rPr lang="en-US" sz="800" dirty="0" err="1"/>
+              <a:rPr lang="en-US" sz="1000" dirty="0" err="1"/>
               <a:t>this.RAM</a:t>
             </a:r>
             <a:r>
-              <a:rPr lang="en-US" sz="800" dirty="0"/>
+              <a:rPr lang="en-US" sz="1000" dirty="0"/>
               <a:t>=ram;</a:t>
             </a:r>
           </a:p>
           <a:p>
             <a:r>
-              <a:rPr lang="en-US" sz="800" dirty="0"/>
+              <a:rPr lang="en-US" sz="1000" dirty="0"/>
               <a:t>}</a:t>
             </a:r>
           </a:p>
@@ -5001,7 +5001,7 @@
         <p:spPr>
           <a:xfrm>
             <a:off x="7588615" y="3096032"/>
-            <a:ext cx="3997565" cy="2277547"/>
+            <a:ext cx="3997565" cy="3016210"/>
           </a:xfrm>
           <a:prstGeom prst="rect">
             <a:avLst/>
@@ -5019,171 +5019,171 @@
           <a:lstStyle/>
           <a:p>
             <a:r>
-              <a:rPr lang="en-US" sz="800" dirty="0"/>
+              <a:rPr lang="en-US" sz="1000" dirty="0"/>
               <a:t>                public ComputerBuilder </a:t>
             </a:r>
             <a:r>
-              <a:rPr lang="en-US" sz="800" dirty="0" err="1"/>
+              <a:rPr lang="en-US" sz="1000" dirty="0" err="1"/>
               <a:t>setGraphicsCardEnabled</a:t>
             </a:r>
             <a:r>
-              <a:rPr lang="en-US" sz="800" dirty="0"/>
+              <a:rPr lang="en-US" sz="1000" dirty="0"/>
               <a:t>(</a:t>
             </a:r>
             <a:r>
-              <a:rPr lang="en-US" sz="800" dirty="0" err="1"/>
+              <a:rPr lang="en-US" sz="1000" dirty="0" err="1"/>
               <a:t>boolean</a:t>
             </a:r>
             <a:r>
-              <a:rPr lang="en-US" sz="800" dirty="0"/>
+              <a:rPr lang="en-US" sz="1000" dirty="0"/>
               <a:t> </a:t>
             </a:r>
             <a:r>
-              <a:rPr lang="en-US" sz="800" dirty="0" err="1"/>
+              <a:rPr lang="en-US" sz="1000" dirty="0" err="1"/>
               <a:t>isGraphicsCardEnabled</a:t>
             </a:r>
             <a:r>
-              <a:rPr lang="en-US" sz="800" dirty="0"/>
+              <a:rPr lang="en-US" sz="1000" dirty="0"/>
               <a:t>) {</a:t>
             </a:r>
           </a:p>
           <a:p>
             <a:r>
-              <a:rPr lang="en-US" sz="800" dirty="0"/>
+              <a:rPr lang="en-US" sz="1000" dirty="0"/>
               <a:t>                             </a:t>
             </a:r>
             <a:r>
-              <a:rPr lang="en-US" sz="800" dirty="0" err="1"/>
+              <a:rPr lang="en-US" sz="1000" dirty="0" err="1"/>
               <a:t>this.isGraphicsCardEnabled</a:t>
             </a:r>
             <a:r>
-              <a:rPr lang="en-US" sz="800" dirty="0"/>
+              <a:rPr lang="en-US" sz="1000" dirty="0"/>
               <a:t> = </a:t>
             </a:r>
             <a:r>
-              <a:rPr lang="en-US" sz="800" dirty="0" err="1"/>
+              <a:rPr lang="en-US" sz="1000" dirty="0" err="1"/>
               <a:t>isGraphicsCardEnabled</a:t>
             </a:r>
             <a:r>
-              <a:rPr lang="en-US" sz="800" dirty="0"/>
+              <a:rPr lang="en-US" sz="1000" dirty="0"/>
               <a:t>;</a:t>
             </a:r>
           </a:p>
           <a:p>
             <a:r>
-              <a:rPr lang="en-US" sz="800" dirty="0"/>
+              <a:rPr lang="en-US" sz="1000" dirty="0"/>
               <a:t>                             return this</a:t>
             </a:r>
           </a:p>
           <a:p>
             <a:r>
-              <a:rPr lang="en-US" sz="800" dirty="0"/>
+              <a:rPr lang="en-US" sz="1000" dirty="0"/>
               <a:t>                 }</a:t>
             </a:r>
           </a:p>
           <a:p>
-            <a:endParaRPr lang="en-US" sz="800" dirty="0"/>
-          </a:p>
-          <a:p>
-            <a:r>
-              <a:rPr lang="en-US" sz="800" dirty="0"/>
+            <a:endParaRPr lang="en-US" sz="1000" dirty="0"/>
+          </a:p>
+          <a:p>
+            <a:r>
+              <a:rPr lang="en-US" sz="1000" dirty="0"/>
               <a:t>                 public ComputerBuilder </a:t>
             </a:r>
             <a:r>
-              <a:rPr lang="en-US" sz="800" dirty="0" err="1"/>
+              <a:rPr lang="en-US" sz="1000" dirty="0" err="1"/>
               <a:t>setBluetoothEnabled</a:t>
             </a:r>
             <a:r>
-              <a:rPr lang="en-US" sz="800" dirty="0"/>
+              <a:rPr lang="en-US" sz="1000" dirty="0"/>
               <a:t>(</a:t>
             </a:r>
             <a:r>
-              <a:rPr lang="en-US" sz="800" dirty="0" err="1"/>
+              <a:rPr lang="en-US" sz="1000" dirty="0" err="1"/>
               <a:t>boolean</a:t>
             </a:r>
             <a:r>
-              <a:rPr lang="en-US" sz="800" dirty="0"/>
+              <a:rPr lang="en-US" sz="1000" dirty="0"/>
               <a:t> </a:t>
             </a:r>
             <a:r>
-              <a:rPr lang="en-US" sz="800" dirty="0" err="1"/>
+              <a:rPr lang="en-US" sz="1000" dirty="0" err="1"/>
               <a:t>isBluetoothEnabled</a:t>
             </a:r>
             <a:r>
-              <a:rPr lang="en-US" sz="800" dirty="0"/>
+              <a:rPr lang="en-US" sz="1000" dirty="0"/>
               <a:t>) {</a:t>
             </a:r>
           </a:p>
           <a:p>
             <a:r>
-              <a:rPr lang="en-US" sz="800" dirty="0"/>
+              <a:rPr lang="en-US" sz="1000" dirty="0"/>
               <a:t>                            </a:t>
             </a:r>
             <a:r>
-              <a:rPr lang="en-US" sz="800" dirty="0" err="1"/>
+              <a:rPr lang="en-US" sz="1000" dirty="0" err="1"/>
               <a:t>this.isBluetoothEnabled</a:t>
             </a:r>
             <a:r>
-              <a:rPr lang="en-US" sz="800" dirty="0"/>
+              <a:rPr lang="en-US" sz="1000" dirty="0"/>
               <a:t> = </a:t>
             </a:r>
             <a:r>
-              <a:rPr lang="en-US" sz="800" dirty="0" err="1"/>
+              <a:rPr lang="en-US" sz="1000" dirty="0" err="1"/>
               <a:t>isBluetoothEnabled</a:t>
             </a:r>
             <a:r>
-              <a:rPr lang="en-US" sz="800" dirty="0"/>
+              <a:rPr lang="en-US" sz="1000" dirty="0"/>
               <a:t>;</a:t>
             </a:r>
           </a:p>
           <a:p>
             <a:r>
-              <a:rPr lang="en-US" sz="800" dirty="0"/>
+              <a:rPr lang="en-US" sz="1000" dirty="0"/>
               <a:t>                            return this;</a:t>
             </a:r>
           </a:p>
           <a:p>
-            <a:endParaRPr lang="en-US" sz="1400" dirty="0"/>
-          </a:p>
-          <a:p>
-            <a:r>
-              <a:rPr lang="en-US" sz="800" dirty="0"/>
+            <a:endParaRPr lang="en-US" sz="1000" dirty="0"/>
+          </a:p>
+          <a:p>
+            <a:r>
+              <a:rPr lang="en-US" sz="1000" dirty="0"/>
               <a:t>		</a:t>
             </a:r>
           </a:p>
           <a:p>
             <a:r>
-              <a:rPr lang="en-US" sz="800" dirty="0"/>
+              <a:rPr lang="en-US" sz="1000" dirty="0"/>
               <a:t>                 public Computer build(){</a:t>
             </a:r>
           </a:p>
           <a:p>
             <a:r>
-              <a:rPr lang="en-US" sz="800" dirty="0"/>
+              <a:rPr lang="en-US" sz="1000" dirty="0"/>
               <a:t>                          return new Computer(this);</a:t>
             </a:r>
           </a:p>
           <a:p>
             <a:r>
-              <a:rPr lang="en-US" sz="800" dirty="0"/>
+              <a:rPr lang="en-US" sz="1000" dirty="0"/>
               <a:t>                  }</a:t>
             </a:r>
           </a:p>
           <a:p>
-            <a:endParaRPr lang="en-US" sz="800" dirty="0"/>
-          </a:p>
-          <a:p>
-            <a:r>
-              <a:rPr lang="en-US" sz="800" dirty="0"/>
+            <a:endParaRPr lang="en-US" sz="1000" dirty="0"/>
+          </a:p>
+          <a:p>
+            <a:r>
+              <a:rPr lang="en-US" sz="1000" dirty="0"/>
               <a:t>        }</a:t>
             </a:r>
           </a:p>
           <a:p>
-            <a:endParaRPr lang="en-US" sz="800" dirty="0"/>
-          </a:p>
-          <a:p>
-            <a:r>
-              <a:rPr lang="en-US" sz="800" dirty="0"/>
+            <a:endParaRPr lang="en-US" sz="1000" dirty="0"/>
+          </a:p>
+          <a:p>
+            <a:r>
+              <a:rPr lang="en-US" sz="1000" dirty="0"/>
               <a:t>}</a:t>
             </a:r>
           </a:p>
@@ -5233,7 +5233,7 @@
         </p:nvSpPr>
         <p:spPr>
           <a:xfrm>
-            <a:off x="326922" y="4831553"/>
+            <a:off x="326922" y="2579970"/>
             <a:ext cx="8356810" cy="1785104"/>
           </a:xfrm>
           <a:prstGeom prst="rect">
@@ -5406,8 +5406,8 @@
         </p:nvSpPr>
         <p:spPr>
           <a:xfrm>
-            <a:off x="2025181" y="6321019"/>
-            <a:ext cx="2160194" cy="369332"/>
+            <a:off x="2939583" y="4551216"/>
+            <a:ext cx="3284236" cy="369332"/>
           </a:xfrm>
           <a:prstGeom prst="rect">
             <a:avLst/>
@@ -5422,7 +5422,7 @@
           <a:p>
             <a:r>
               <a:rPr lang="en-US" dirty="0"/>
-              <a:t>Test Program</a:t>
+              <a:t>Test Program to Computer class</a:t>
             </a:r>
           </a:p>
         </p:txBody>
@@ -5907,7 +5907,7 @@
         </p:nvSpPr>
         <p:spPr>
           <a:xfrm>
-            <a:off x="6150090" y="5719306"/>
+            <a:off x="6150090" y="5955282"/>
             <a:ext cx="2934915" cy="369332"/>
           </a:xfrm>
           <a:prstGeom prst="rect">

</xml_diff>